<commit_message>
update the archi and ensure we are not overriding dist
</commit_message>
<xml_diff>
--- a/architecture.pptx
+++ b/architecture.pptx
@@ -288,7 +288,7 @@
           <a:p>
             <a:fld id="{5BA1F397-4865-F24D-9DAB-C28803DD4FDE}" type="datetimeFigureOut">
               <a:rPr lang="fr-FR" smtClean="0"/>
-              <a:t>26/06/21</a:t>
+              <a:t>29/06/21</a:t>
             </a:fld>
             <a:endParaRPr lang="fr-FR"/>
           </a:p>
@@ -458,7 +458,7 @@
           <a:p>
             <a:fld id="{5BA1F397-4865-F24D-9DAB-C28803DD4FDE}" type="datetimeFigureOut">
               <a:rPr lang="fr-FR" smtClean="0"/>
-              <a:t>26/06/21</a:t>
+              <a:t>29/06/21</a:t>
             </a:fld>
             <a:endParaRPr lang="fr-FR"/>
           </a:p>
@@ -638,7 +638,7 @@
           <a:p>
             <a:fld id="{5BA1F397-4865-F24D-9DAB-C28803DD4FDE}" type="datetimeFigureOut">
               <a:rPr lang="fr-FR" smtClean="0"/>
-              <a:t>26/06/21</a:t>
+              <a:t>29/06/21</a:t>
             </a:fld>
             <a:endParaRPr lang="fr-FR"/>
           </a:p>
@@ -808,7 +808,7 @@
           <a:p>
             <a:fld id="{5BA1F397-4865-F24D-9DAB-C28803DD4FDE}" type="datetimeFigureOut">
               <a:rPr lang="fr-FR" smtClean="0"/>
-              <a:t>26/06/21</a:t>
+              <a:t>29/06/21</a:t>
             </a:fld>
             <a:endParaRPr lang="fr-FR"/>
           </a:p>
@@ -1054,7 +1054,7 @@
           <a:p>
             <a:fld id="{5BA1F397-4865-F24D-9DAB-C28803DD4FDE}" type="datetimeFigureOut">
               <a:rPr lang="fr-FR" smtClean="0"/>
-              <a:t>26/06/21</a:t>
+              <a:t>29/06/21</a:t>
             </a:fld>
             <a:endParaRPr lang="fr-FR"/>
           </a:p>
@@ -1342,7 +1342,7 @@
           <a:p>
             <a:fld id="{5BA1F397-4865-F24D-9DAB-C28803DD4FDE}" type="datetimeFigureOut">
               <a:rPr lang="fr-FR" smtClean="0"/>
-              <a:t>26/06/21</a:t>
+              <a:t>29/06/21</a:t>
             </a:fld>
             <a:endParaRPr lang="fr-FR"/>
           </a:p>
@@ -1764,7 +1764,7 @@
           <a:p>
             <a:fld id="{5BA1F397-4865-F24D-9DAB-C28803DD4FDE}" type="datetimeFigureOut">
               <a:rPr lang="fr-FR" smtClean="0"/>
-              <a:t>26/06/21</a:t>
+              <a:t>29/06/21</a:t>
             </a:fld>
             <a:endParaRPr lang="fr-FR"/>
           </a:p>
@@ -1882,7 +1882,7 @@
           <a:p>
             <a:fld id="{5BA1F397-4865-F24D-9DAB-C28803DD4FDE}" type="datetimeFigureOut">
               <a:rPr lang="fr-FR" smtClean="0"/>
-              <a:t>26/06/21</a:t>
+              <a:t>29/06/21</a:t>
             </a:fld>
             <a:endParaRPr lang="fr-FR"/>
           </a:p>
@@ -1977,7 +1977,7 @@
           <a:p>
             <a:fld id="{5BA1F397-4865-F24D-9DAB-C28803DD4FDE}" type="datetimeFigureOut">
               <a:rPr lang="fr-FR" smtClean="0"/>
-              <a:t>26/06/21</a:t>
+              <a:t>29/06/21</a:t>
             </a:fld>
             <a:endParaRPr lang="fr-FR"/>
           </a:p>
@@ -2254,7 +2254,7 @@
           <a:p>
             <a:fld id="{5BA1F397-4865-F24D-9DAB-C28803DD4FDE}" type="datetimeFigureOut">
               <a:rPr lang="fr-FR" smtClean="0"/>
-              <a:t>26/06/21</a:t>
+              <a:t>29/06/21</a:t>
             </a:fld>
             <a:endParaRPr lang="fr-FR"/>
           </a:p>
@@ -2507,7 +2507,7 @@
           <a:p>
             <a:fld id="{5BA1F397-4865-F24D-9DAB-C28803DD4FDE}" type="datetimeFigureOut">
               <a:rPr lang="fr-FR" smtClean="0"/>
-              <a:t>26/06/21</a:t>
+              <a:t>29/06/21</a:t>
             </a:fld>
             <a:endParaRPr lang="fr-FR"/>
           </a:p>
@@ -2720,7 +2720,7 @@
           <a:p>
             <a:fld id="{5BA1F397-4865-F24D-9DAB-C28803DD4FDE}" type="datetimeFigureOut">
               <a:rPr lang="fr-FR" smtClean="0"/>
-              <a:t>26/06/21</a:t>
+              <a:t>29/06/21</a:t>
             </a:fld>
             <a:endParaRPr lang="fr-FR"/>
           </a:p>
@@ -3360,8 +3360,8 @@
         </p:nvSpPr>
         <p:spPr>
           <a:xfrm>
-            <a:off x="2764964" y="1543853"/>
-            <a:ext cx="1421333" cy="923330"/>
+            <a:off x="2776651" y="1644157"/>
+            <a:ext cx="1201771" cy="923330"/>
           </a:xfrm>
           <a:prstGeom prst="rect">
             <a:avLst/>
@@ -3376,21 +3376,29 @@
           <a:p>
             <a:r>
               <a:rPr lang="fr-FR" dirty="0" err="1" smtClean="0"/>
-              <a:t>createReport</a:t>
+              <a:t>checkZone</a:t>
             </a:r>
             <a:endParaRPr lang="fr-FR" dirty="0" smtClean="0"/>
           </a:p>
           <a:p>
             <a:r>
               <a:rPr lang="fr-FR" dirty="0" err="1" smtClean="0"/>
-              <a:t>getReport</a:t>
+              <a:t>Get</a:t>
+            </a:r>
+            <a:r>
+              <a:rPr lang="fr-FR" dirty="0" err="1" smtClean="0"/>
+              <a:t>Report</a:t>
             </a:r>
             <a:endParaRPr lang="fr-FR" dirty="0" smtClean="0"/>
           </a:p>
           <a:p>
             <a:r>
               <a:rPr lang="fr-FR" dirty="0" err="1" smtClean="0"/>
-              <a:t>getReports</a:t>
+              <a:t>Add</a:t>
+            </a:r>
+            <a:r>
+              <a:rPr lang="fr-FR" dirty="0" err="1" smtClean="0"/>
+              <a:t>Report</a:t>
             </a:r>
             <a:endParaRPr lang="fr-FR" dirty="0" smtClean="0"/>
           </a:p>
@@ -3404,10 +3412,10 @@
         </p:nvGrpSpPr>
         <p:grpSpPr>
           <a:xfrm>
-            <a:off x="1979953" y="874590"/>
-            <a:ext cx="1551063" cy="552806"/>
-            <a:chOff x="1979953" y="874590"/>
-            <a:chExt cx="1551063" cy="552806"/>
+            <a:off x="1843050" y="881767"/>
+            <a:ext cx="1551063" cy="545629"/>
+            <a:chOff x="1843050" y="881767"/>
+            <a:chExt cx="1551063" cy="545629"/>
           </a:xfrm>
         </p:grpSpPr>
         <p:sp>
@@ -3456,7 +3464,7 @@
           </p:nvSpPr>
           <p:spPr>
             <a:xfrm>
-              <a:off x="1979953" y="874590"/>
+              <a:off x="1843050" y="881767"/>
               <a:ext cx="1551063" cy="369332"/>
             </a:xfrm>
             <a:prstGeom prst="rect">
@@ -3574,7 +3582,7 @@
         </p:nvSpPr>
         <p:spPr>
           <a:xfrm>
-            <a:off x="2866851" y="3217950"/>
+            <a:off x="2929520" y="3092794"/>
             <a:ext cx="1133644" cy="646331"/>
           </a:xfrm>
           <a:prstGeom prst="rect">
@@ -3647,7 +3655,7 @@
         </p:nvCxnSpPr>
         <p:spPr>
           <a:xfrm>
-            <a:off x="5302458" y="6532502"/>
+            <a:off x="6377946" y="593851"/>
             <a:ext cx="826968" cy="1"/>
           </a:xfrm>
           <a:prstGeom prst="straightConnector1">
@@ -3680,7 +3688,7 @@
         </p:nvSpPr>
         <p:spPr>
           <a:xfrm>
-            <a:off x="6172259" y="6338514"/>
+            <a:off x="7247747" y="399863"/>
             <a:ext cx="948171" cy="369332"/>
           </a:xfrm>
           <a:prstGeom prst="rect">
@@ -3793,10 +3801,10 @@
         </p:nvGrpSpPr>
         <p:grpSpPr>
           <a:xfrm>
-            <a:off x="3904575" y="4266271"/>
-            <a:ext cx="1710775" cy="545629"/>
+            <a:off x="4375131" y="6004198"/>
+            <a:ext cx="1710775" cy="839488"/>
             <a:chOff x="6479460" y="1138296"/>
-            <a:chExt cx="1710775" cy="545629"/>
+            <a:chExt cx="1710775" cy="839488"/>
           </a:xfrm>
         </p:grpSpPr>
         <p:sp>
@@ -3845,7 +3853,7 @@
           </p:nvSpPr>
           <p:spPr>
             <a:xfrm>
-              <a:off x="6479460" y="1242730"/>
+              <a:off x="6479460" y="1608452"/>
               <a:ext cx="1710775" cy="369332"/>
             </a:xfrm>
             <a:prstGeom prst="rect">
@@ -3877,9 +3885,9 @@
         <p:grpSpPr>
           <a:xfrm>
             <a:off x="6782132" y="2822222"/>
-            <a:ext cx="1895621" cy="545629"/>
+            <a:ext cx="1973166" cy="545629"/>
             <a:chOff x="6479460" y="1138296"/>
-            <a:chExt cx="1895621" cy="545629"/>
+            <a:chExt cx="1973166" cy="545629"/>
           </a:xfrm>
         </p:grpSpPr>
         <p:sp>
@@ -3929,7 +3937,7 @@
           <p:spPr>
             <a:xfrm>
               <a:off x="6479460" y="1242730"/>
-              <a:ext cx="1895621" cy="369332"/>
+              <a:ext cx="1973166" cy="369332"/>
             </a:xfrm>
             <a:prstGeom prst="rect">
               <a:avLst/>
@@ -3944,7 +3952,7 @@
             <a:p>
               <a:r>
                 <a:rPr lang="fr-FR" dirty="0" err="1" smtClean="0"/>
-                <a:t>Request_manager</a:t>
+                <a:t>Collector_manager</a:t>
               </a:r>
               <a:endParaRPr lang="fr-FR" dirty="0"/>
             </a:p>
@@ -4063,7 +4071,7 @@
         </p:nvCxnSpPr>
         <p:spPr>
           <a:xfrm>
-            <a:off x="5302458" y="6336265"/>
+            <a:off x="6377946" y="397614"/>
             <a:ext cx="826968" cy="0"/>
           </a:xfrm>
           <a:prstGeom prst="straightConnector1">
@@ -4099,7 +4107,7 @@
         </p:nvSpPr>
         <p:spPr>
           <a:xfrm>
-            <a:off x="6166000" y="6116135"/>
+            <a:off x="7241488" y="177484"/>
             <a:ext cx="1713029" cy="369332"/>
           </a:xfrm>
           <a:prstGeom prst="rect">
@@ -4125,14 +4133,14 @@
         <p:nvCxnSpPr>
           <p:cNvPr id="74" name="Connecteur droit avec flèche 73"/>
           <p:cNvCxnSpPr>
-            <a:endCxn id="6" idx="4"/>
+            <a:stCxn id="6" idx="0"/>
           </p:cNvCxnSpPr>
           <p:nvPr/>
         </p:nvCxnSpPr>
         <p:spPr>
           <a:xfrm flipV="1">
-            <a:off x="4656667" y="4811900"/>
-            <a:ext cx="51663" cy="398483"/>
+            <a:off x="5178886" y="5464384"/>
+            <a:ext cx="0" cy="539814"/>
           </a:xfrm>
           <a:prstGeom prst="straightConnector1">
             <a:avLst/>
@@ -4141,6 +4149,7 @@
             <a:solidFill>
               <a:schemeClr val="accent6"/>
             </a:solidFill>
+            <a:headEnd type="arrow"/>
             <a:tailEnd type="arrow"/>
           </a:ln>
         </p:spPr>
@@ -4163,14 +4172,15 @@
         <p:nvCxnSpPr>
           <p:cNvPr id="77" name="Connecteur droit avec flèche 76"/>
           <p:cNvCxnSpPr>
+            <a:stCxn id="6" idx="6"/>
             <a:endCxn id="83" idx="1"/>
           </p:cNvCxnSpPr>
           <p:nvPr/>
         </p:nvCxnSpPr>
         <p:spPr>
           <a:xfrm>
-            <a:off x="4845530" y="4297133"/>
-            <a:ext cx="996470" cy="0"/>
+            <a:off x="5451700" y="6277013"/>
+            <a:ext cx="1772410" cy="25007"/>
           </a:xfrm>
           <a:prstGeom prst="straightConnector1">
             <a:avLst/>
@@ -4208,7 +4218,7 @@
         </p:nvSpPr>
         <p:spPr>
           <a:xfrm>
-            <a:off x="5842000" y="4112467"/>
+            <a:off x="7224110" y="6117354"/>
             <a:ext cx="1531188" cy="369332"/>
           </a:xfrm>
           <a:prstGeom prst="rect">
@@ -4240,7 +4250,7 @@
         </p:nvSpPr>
         <p:spPr>
           <a:xfrm>
-            <a:off x="5035704" y="3495511"/>
+            <a:off x="2383891" y="6180495"/>
             <a:ext cx="1550274" cy="369332"/>
           </a:xfrm>
           <a:prstGeom prst="rect">
@@ -4268,15 +4278,15 @@
         <p:nvCxnSpPr>
           <p:cNvPr id="85" name="Connecteur droit avec flèche 84"/>
           <p:cNvCxnSpPr>
-            <a:stCxn id="84" idx="1"/>
-            <a:endCxn id="6" idx="0"/>
+            <a:stCxn id="84" idx="3"/>
+            <a:endCxn id="6" idx="2"/>
           </p:cNvCxnSpPr>
           <p:nvPr/>
         </p:nvCxnSpPr>
         <p:spPr>
-          <a:xfrm flipH="1">
-            <a:off x="4708330" y="3680177"/>
-            <a:ext cx="327374" cy="586094"/>
+          <a:xfrm flipV="1">
+            <a:off x="3934165" y="6277013"/>
+            <a:ext cx="971906" cy="88148"/>
           </a:xfrm>
           <a:prstGeom prst="straightConnector1">
             <a:avLst/>
@@ -4287,42 +4297,6 @@
                 <a:lumMod val="40000"/>
                 <a:lumOff val="60000"/>
               </a:schemeClr>
-            </a:solidFill>
-            <a:tailEnd type="arrow"/>
-          </a:ln>
-        </p:spPr>
-        <p:style>
-          <a:lnRef idx="2">
-            <a:schemeClr val="accent3"/>
-          </a:lnRef>
-          <a:fillRef idx="0">
-            <a:schemeClr val="accent3"/>
-          </a:fillRef>
-          <a:effectRef idx="1">
-            <a:schemeClr val="accent3"/>
-          </a:effectRef>
-          <a:fontRef idx="minor">
-            <a:schemeClr val="tx1"/>
-          </a:fontRef>
-        </p:style>
-      </p:cxnSp>
-      <p:cxnSp>
-        <p:nvCxnSpPr>
-          <p:cNvPr id="89" name="Connecteur droit avec flèche 88"/>
-          <p:cNvCxnSpPr/>
-          <p:nvPr/>
-        </p:nvCxnSpPr>
-        <p:spPr>
-          <a:xfrm flipH="1">
-            <a:off x="4365037" y="4740037"/>
-            <a:ext cx="70478" cy="470346"/>
-          </a:xfrm>
-          <a:prstGeom prst="straightConnector1">
-            <a:avLst/>
-          </a:prstGeom>
-          <a:ln>
-            <a:solidFill>
-              <a:schemeClr val="accent6"/>
             </a:solidFill>
             <a:tailEnd type="arrow"/>
           </a:ln>
@@ -4388,7 +4362,7 @@
         </p:nvSpPr>
         <p:spPr>
           <a:xfrm>
-            <a:off x="4845530" y="4813219"/>
+            <a:off x="6782132" y="4807975"/>
             <a:ext cx="1472729" cy="369332"/>
           </a:xfrm>
           <a:prstGeom prst="rect">
@@ -4418,8 +4392,8 @@
         </p:nvSpPr>
         <p:spPr>
           <a:xfrm>
-            <a:off x="2496117" y="4829223"/>
-            <a:ext cx="2069797" cy="369332"/>
+            <a:off x="3330934" y="5627965"/>
+            <a:ext cx="1710725" cy="369332"/>
           </a:xfrm>
           <a:prstGeom prst="rect">
             <a:avLst/>
@@ -4434,7 +4408,157 @@
           <a:p>
             <a:r>
               <a:rPr lang="fr-FR" dirty="0" err="1" smtClean="0"/>
-              <a:t>Collect_done_event</a:t>
+              <a:t>Collect</a:t>
+            </a:r>
+            <a:r>
+              <a:rPr lang="fr-FR" dirty="0" err="1" smtClean="0"/>
+              <a:t>ed</a:t>
+            </a:r>
+            <a:r>
+              <a:rPr lang="fr-FR" dirty="0" err="1" smtClean="0"/>
+              <a:t>_event</a:t>
+            </a:r>
+            <a:endParaRPr lang="fr-FR" dirty="0"/>
+          </a:p>
+        </p:txBody>
+      </p:sp>
+      <p:sp>
+        <p:nvSpPr>
+          <p:cNvPr id="42" name="ZoneTexte 41"/>
+          <p:cNvSpPr txBox="1"/>
+          <p:nvPr/>
+        </p:nvSpPr>
+        <p:spPr>
+          <a:xfrm>
+            <a:off x="1342718" y="3367851"/>
+            <a:ext cx="947044" cy="369332"/>
+          </a:xfrm>
+          <a:prstGeom prst="rect">
+            <a:avLst/>
+          </a:prstGeom>
+          <a:noFill/>
+        </p:spPr>
+        <p:txBody>
+          <a:bodyPr wrap="none" rtlCol="0">
+            <a:spAutoFit/>
+          </a:bodyPr>
+          <a:lstStyle/>
+          <a:p>
+            <a:r>
+              <a:rPr lang="fr-FR" dirty="0" err="1" smtClean="0"/>
+              <a:t>getStats</a:t>
+            </a:r>
+            <a:endParaRPr lang="fr-FR" dirty="0" smtClean="0"/>
+          </a:p>
+        </p:txBody>
+      </p:sp>
+      <p:sp>
+        <p:nvSpPr>
+          <p:cNvPr id="43" name="ZoneTexte 42"/>
+          <p:cNvSpPr txBox="1"/>
+          <p:nvPr/>
+        </p:nvSpPr>
+        <p:spPr>
+          <a:xfrm>
+            <a:off x="1197249" y="1722032"/>
+            <a:ext cx="1421333" cy="923330"/>
+          </a:xfrm>
+          <a:prstGeom prst="rect">
+            <a:avLst/>
+          </a:prstGeom>
+          <a:noFill/>
+        </p:spPr>
+        <p:txBody>
+          <a:bodyPr wrap="none" rtlCol="0">
+            <a:spAutoFit/>
+          </a:bodyPr>
+          <a:lstStyle/>
+          <a:p>
+            <a:r>
+              <a:rPr lang="fr-FR" dirty="0" err="1" smtClean="0"/>
+              <a:t>createReport</a:t>
+            </a:r>
+            <a:endParaRPr lang="fr-FR" dirty="0" smtClean="0"/>
+          </a:p>
+          <a:p>
+            <a:r>
+              <a:rPr lang="fr-FR" dirty="0" err="1" smtClean="0"/>
+              <a:t>getReport</a:t>
+            </a:r>
+            <a:endParaRPr lang="fr-FR" dirty="0" smtClean="0"/>
+          </a:p>
+          <a:p>
+            <a:r>
+              <a:rPr lang="fr-FR" dirty="0" err="1" smtClean="0"/>
+              <a:t>getReports</a:t>
+            </a:r>
+            <a:endParaRPr lang="fr-FR" dirty="0" smtClean="0"/>
+          </a:p>
+        </p:txBody>
+      </p:sp>
+      <p:sp>
+        <p:nvSpPr>
+          <p:cNvPr id="49" name="ZoneTexte 48"/>
+          <p:cNvSpPr txBox="1"/>
+          <p:nvPr/>
+        </p:nvSpPr>
+        <p:spPr>
+          <a:xfrm>
+            <a:off x="5309403" y="5627965"/>
+            <a:ext cx="1472729" cy="369332"/>
+          </a:xfrm>
+          <a:prstGeom prst="rect">
+            <a:avLst/>
+          </a:prstGeom>
+          <a:noFill/>
+        </p:spPr>
+        <p:txBody>
+          <a:bodyPr wrap="none" rtlCol="0">
+            <a:spAutoFit/>
+          </a:bodyPr>
+          <a:lstStyle/>
+          <a:p>
+            <a:r>
+              <a:rPr lang="fr-FR" dirty="0" err="1" smtClean="0"/>
+              <a:t>Collect_event</a:t>
+            </a:r>
+            <a:endParaRPr lang="fr-FR" dirty="0"/>
+          </a:p>
+        </p:txBody>
+      </p:sp>
+      <p:sp>
+        <p:nvSpPr>
+          <p:cNvPr id="60" name="ZoneTexte 59"/>
+          <p:cNvSpPr txBox="1"/>
+          <p:nvPr/>
+        </p:nvSpPr>
+        <p:spPr>
+          <a:xfrm>
+            <a:off x="2819590" y="4623309"/>
+            <a:ext cx="1710725" cy="369332"/>
+          </a:xfrm>
+          <a:prstGeom prst="rect">
+            <a:avLst/>
+          </a:prstGeom>
+          <a:noFill/>
+        </p:spPr>
+        <p:txBody>
+          <a:bodyPr wrap="none" rtlCol="0">
+            <a:spAutoFit/>
+          </a:bodyPr>
+          <a:lstStyle/>
+          <a:p>
+            <a:r>
+              <a:rPr lang="fr-FR" dirty="0" err="1" smtClean="0"/>
+              <a:t>Collect</a:t>
+            </a:r>
+            <a:r>
+              <a:rPr lang="fr-FR" dirty="0" err="1" smtClean="0"/>
+              <a:t>ed</a:t>
+            </a:r>
+            <a:r>
+              <a:rPr lang="fr-FR" dirty="0" err="1" smtClean="0"/>
+              <a:t>_event</a:t>
             </a:r>
             <a:endParaRPr lang="fr-FR" dirty="0"/>
           </a:p>

</xml_diff>